<commit_message>
first part of RcppArmadillo
</commit_message>
<xml_diff>
--- a/leture_powerpoint_0104.pptx
+++ b/leture_powerpoint_0104.pptx
@@ -375,7 +375,7 @@
             <a:fld id="{EA33B4B9-AFB0-43EB-82AF-ED70AC262E4F}" type="datetimeFigureOut">
               <a:rPr lang="en-US" smtClean="0"/>
               <a:pPr/>
-              <a:t>1/4/2019</a:t>
+              <a:t>1/5/2019</a:t>
             </a:fld>
             <a:endParaRPr lang="en-US"/>
           </a:p>
@@ -543,7 +543,7 @@
             <a:fld id="{3D31E77A-DD07-4A76-801D-B4BF4990C412}" type="datetimeFigureOut">
               <a:rPr lang="en-US" smtClean="0"/>
               <a:pPr/>
-              <a:t>1/4/2019</a:t>
+              <a:t>1/5/2019</a:t>
             </a:fld>
             <a:endParaRPr lang="en-US"/>
           </a:p>
@@ -1920,7 +1920,7 @@
           <a:p>
             <a:r>
               <a:rPr lang="en-US" dirty="0"/>
-              <a:t>2019/01/03</a:t>
+              <a:t>2019/01/04</a:t>
             </a:r>
           </a:p>
         </p:txBody>
@@ -2195,7 +2195,7 @@
           <a:p>
             <a:r>
               <a:rPr lang="en-US" dirty="0"/>
-              <a:t>2019/01/03</a:t>
+              <a:t>2019/01/04</a:t>
             </a:r>
           </a:p>
         </p:txBody>
@@ -3220,7 +3220,7 @@
           <a:p>
             <a:r>
               <a:rPr lang="en-US" dirty="0"/>
-              <a:t>2019/01/03</a:t>
+              <a:t>2019/01/04</a:t>
             </a:r>
           </a:p>
         </p:txBody>
@@ -4252,7 +4252,7 @@
           <a:p>
             <a:r>
               <a:rPr lang="en-US" dirty="0"/>
-              <a:t>2019/01/03</a:t>
+              <a:t>2019/01/04</a:t>
             </a:r>
           </a:p>
         </p:txBody>
@@ -5909,7 +5909,7 @@
           <a:p>
             <a:r>
               <a:rPr lang="en-US" dirty="0"/>
-              <a:t>2019/01/03</a:t>
+              <a:t>2019/01/04</a:t>
             </a:r>
           </a:p>
         </p:txBody>
@@ -6169,7 +6169,7 @@
           <a:p>
             <a:r>
               <a:rPr lang="en-US" dirty="0"/>
-              <a:t>2019/01/03</a:t>
+              <a:t>2019/01/04</a:t>
             </a:r>
           </a:p>
         </p:txBody>
@@ -7213,7 +7213,7 @@
           <a:p>
             <a:r>
               <a:rPr lang="en-US" dirty="0"/>
-              <a:t>2019/01/03</a:t>
+              <a:t>2019/01/04</a:t>
             </a:r>
           </a:p>
         </p:txBody>
@@ -7367,7 +7367,7 @@
           <a:p>
             <a:r>
               <a:rPr lang="en-US" dirty="0"/>
-              <a:t>2019/01/03</a:t>
+              <a:t>2019/01/04</a:t>
             </a:r>
           </a:p>
         </p:txBody>
@@ -8364,7 +8364,7 @@
           <a:p>
             <a:r>
               <a:rPr lang="en-US" dirty="0"/>
-              <a:t>2019/01/03</a:t>
+              <a:t>2019/01/04</a:t>
             </a:r>
           </a:p>
         </p:txBody>
@@ -8778,7 +8778,7 @@
           <a:p>
             <a:r>
               <a:rPr lang="en-US" dirty="0"/>
-              <a:t>2019/01/03</a:t>
+              <a:t>2019/01/04</a:t>
             </a:r>
           </a:p>
         </p:txBody>
@@ -9091,7 +9091,7 @@
           <a:p>
             <a:r>
               <a:rPr lang="en-US" dirty="0"/>
-              <a:t>2019/01/03</a:t>
+              <a:t>2019/01/04</a:t>
             </a:r>
           </a:p>
         </p:txBody>
@@ -10367,7 +10367,7 @@
           <a:p>
             <a:r>
               <a:rPr lang="en-US" dirty="0"/>
-              <a:t>2019/01/03</a:t>
+              <a:t>2019/01/04</a:t>
             </a:r>
           </a:p>
         </p:txBody>
@@ -10567,7 +10567,7 @@
           <a:p>
             <a:r>
               <a:rPr lang="en-US" dirty="0"/>
-              <a:t>2019/01/03</a:t>
+              <a:t>2019/01/04</a:t>
             </a:r>
           </a:p>
         </p:txBody>
@@ -10777,7 +10777,7 @@
           <a:p>
             <a:r>
               <a:rPr lang="en-US" dirty="0"/>
-              <a:t>2019/01/03</a:t>
+              <a:t>2019/01/04</a:t>
             </a:r>
           </a:p>
         </p:txBody>
@@ -10983,7 +10983,7 @@
           <a:p>
             <a:r>
               <a:rPr lang="en-US" dirty="0"/>
-              <a:t>2019/01/03</a:t>
+              <a:t>2019/01/04</a:t>
             </a:r>
           </a:p>
         </p:txBody>
@@ -11274,7 +11274,7 @@
           <a:p>
             <a:r>
               <a:rPr lang="en-US" dirty="0"/>
-              <a:t>2019/01/03</a:t>
+              <a:t>2019/01/04</a:t>
             </a:r>
           </a:p>
         </p:txBody>
@@ -12345,7 +12345,7 @@
           <a:p>
             <a:r>
               <a:rPr lang="en-US" dirty="0"/>
-              <a:t>2019/01/03</a:t>
+              <a:t>2019/01/04</a:t>
             </a:r>
           </a:p>
         </p:txBody>
@@ -13359,7 +13359,7 @@
           <a:p>
             <a:r>
               <a:rPr lang="en-US" dirty="0"/>
-              <a:t>2019/01/03</a:t>
+              <a:t>2019/01/04</a:t>
             </a:r>
           </a:p>
         </p:txBody>
@@ -14517,7 +14517,7 @@
           <a:p>
             <a:r>
               <a:rPr lang="en-US" dirty="0"/>
-              <a:t>2019/01/03</a:t>
+              <a:t>2019/01/04</a:t>
             </a:r>
           </a:p>
         </p:txBody>
@@ -15642,7 +15642,7 @@
           <a:p>
             <a:r>
               <a:rPr lang="en-US" dirty="0"/>
-              <a:t>2019/01/03</a:t>
+              <a:t>2019/01/04</a:t>
             </a:r>
           </a:p>
         </p:txBody>
@@ -16796,7 +16796,7 @@
           <a:p>
             <a:r>
               <a:rPr lang="en-US" dirty="0"/>
-              <a:t>2019/01/03</a:t>
+              <a:t>2019/01/04</a:t>
             </a:r>
           </a:p>
         </p:txBody>
@@ -17852,7 +17852,7 @@
           <a:p>
             <a:r>
               <a:rPr lang="en-US" dirty="0"/>
-              <a:t>2019/01/03</a:t>
+              <a:t>2019/01/04</a:t>
             </a:r>
           </a:p>
         </p:txBody>
@@ -19163,7 +19163,7 @@
           <a:p>
             <a:r>
               <a:rPr lang="en-US" dirty="0"/>
-              <a:t>2019/01/03</a:t>
+              <a:t>2019/01/04</a:t>
             </a:r>
           </a:p>
         </p:txBody>
@@ -19399,7 +19399,7 @@
           <a:p>
             <a:r>
               <a:rPr lang="en-US" dirty="0"/>
-              <a:t>2019/01/03</a:t>
+              <a:t>2019/01/04</a:t>
             </a:r>
           </a:p>
         </p:txBody>
@@ -19628,7 +19628,7 @@
           <a:p>
             <a:r>
               <a:rPr lang="en-US" dirty="0"/>
-              <a:t>2019/01/03</a:t>
+              <a:t>2019/01/04</a:t>
             </a:r>
           </a:p>
         </p:txBody>
@@ -19838,7 +19838,7 @@
           <a:p>
             <a:r>
               <a:rPr lang="en-US" dirty="0"/>
-              <a:t>2019/01/03</a:t>
+              <a:t>2019/01/04</a:t>
             </a:r>
           </a:p>
         </p:txBody>
@@ -20062,7 +20062,7 @@
           <a:p>
             <a:r>
               <a:rPr lang="en-US" dirty="0"/>
-              <a:t>2019/01/03</a:t>
+              <a:t>2019/01/04</a:t>
             </a:r>
           </a:p>
         </p:txBody>
@@ -20266,7 +20266,7 @@
           <a:p>
             <a:r>
               <a:rPr lang="en-US" dirty="0"/>
-              <a:t>2019/01/03</a:t>
+              <a:t>2019/01/04</a:t>
             </a:r>
           </a:p>
         </p:txBody>
@@ -20549,7 +20549,7 @@
           <a:p>
             <a:r>
               <a:rPr lang="en-US" dirty="0"/>
-              <a:t>2019/01/03</a:t>
+              <a:t>2019/01/04</a:t>
             </a:r>
           </a:p>
         </p:txBody>
@@ -20779,7 +20779,7 @@
           <a:p>
             <a:r>
               <a:rPr lang="en-US" dirty="0"/>
-              <a:t>2019/01/03</a:t>
+              <a:t>2019/01/04</a:t>
             </a:r>
           </a:p>
         </p:txBody>
@@ -20989,7 +20989,7 @@
           <a:p>
             <a:r>
               <a:rPr lang="en-US" dirty="0"/>
-              <a:t>2019/01/03</a:t>
+              <a:t>2019/01/04</a:t>
             </a:r>
           </a:p>
         </p:txBody>
@@ -21531,7 +21531,7 @@
           <a:p>
             <a:r>
               <a:rPr lang="en-US" dirty="0"/>
-              <a:t>2019/01/03</a:t>
+              <a:t>2019/01/04</a:t>
             </a:r>
           </a:p>
         </p:txBody>
@@ -27494,7 +27494,7 @@
           <a:p>
             <a:r>
               <a:rPr lang="en-US" dirty="0"/>
-              <a:t>2019/01/03</a:t>
+              <a:t>2019/01/04</a:t>
             </a:r>
           </a:p>
         </p:txBody>
@@ -27734,7 +27734,7 @@
           <a:p>
             <a:r>
               <a:rPr lang="en-US" dirty="0"/>
-              <a:t>2019/01/03</a:t>
+              <a:t>2019/01/04</a:t>
             </a:r>
           </a:p>
         </p:txBody>
@@ -28007,10 +28007,9 @@
           <a:lstStyle/>
           <a:p>
             <a:r>
-              <a:rPr lang="en-US"/>
-              <a:t>2019/01/03</a:t>
-            </a:r>
-            <a:endParaRPr lang="en-US" dirty="0"/>
+              <a:rPr lang="en-US" dirty="0"/>
+              <a:t>2019/01/04</a:t>
+            </a:r>
           </a:p>
         </p:txBody>
       </p:sp>
@@ -28250,7 +28249,7 @@
           <a:p>
             <a:r>
               <a:rPr lang="en-US" dirty="0"/>
-              <a:t>2019/01/03</a:t>
+              <a:t>2019/01/04</a:t>
             </a:r>
           </a:p>
         </p:txBody>
@@ -28520,7 +28519,7 @@
           <a:p>
             <a:r>
               <a:rPr lang="en-US" dirty="0"/>
-              <a:t>2019/01/03</a:t>
+              <a:t>2019/01/04</a:t>
             </a:r>
           </a:p>
         </p:txBody>
@@ -28718,10 +28717,9 @@
           <a:lstStyle/>
           <a:p>
             <a:r>
-              <a:rPr lang="en-US"/>
-              <a:t>2019/01/03</a:t>
-            </a:r>
-            <a:endParaRPr lang="en-US" dirty="0"/>
+              <a:rPr lang="en-US" dirty="0"/>
+              <a:t>2019/01/04</a:t>
+            </a:r>
           </a:p>
         </p:txBody>
       </p:sp>
@@ -29179,10 +29177,9 @@
           <a:lstStyle/>
           <a:p>
             <a:r>
-              <a:rPr lang="en-US"/>
-              <a:t>2019/01/03</a:t>
-            </a:r>
-            <a:endParaRPr lang="en-US" dirty="0"/>
+              <a:rPr lang="en-US" dirty="0"/>
+              <a:t>2019/01/04</a:t>
+            </a:r>
           </a:p>
         </p:txBody>
       </p:sp>
@@ -29400,10 +29397,9 @@
           <a:lstStyle/>
           <a:p>
             <a:r>
-              <a:rPr lang="en-US"/>
-              <a:t>2019/01/03</a:t>
-            </a:r>
-            <a:endParaRPr lang="en-US" dirty="0"/>
+              <a:rPr lang="en-US" dirty="0"/>
+              <a:t>2019/01/04</a:t>
+            </a:r>
           </a:p>
         </p:txBody>
       </p:sp>
@@ -29613,7 +29609,7 @@
           <a:p>
             <a:r>
               <a:rPr lang="en-US" dirty="0"/>
-              <a:t>2019/01/03</a:t>
+              <a:t>2019/01/04</a:t>
             </a:r>
           </a:p>
         </p:txBody>
@@ -29869,7 +29865,7 @@
           <a:p>
             <a:r>
               <a:rPr lang="en-US" dirty="0"/>
-              <a:t>2019/01/03</a:t>
+              <a:t>2019/01/04</a:t>
             </a:r>
           </a:p>
         </p:txBody>
@@ -30890,7 +30886,7 @@
           <a:p>
             <a:r>
               <a:rPr lang="en-US" dirty="0"/>
-              <a:t>2019/01/03</a:t>
+              <a:t>2019/01/04</a:t>
             </a:r>
           </a:p>
         </p:txBody>
@@ -31262,10 +31258,9 @@
           <a:lstStyle/>
           <a:p>
             <a:r>
-              <a:rPr lang="en-US"/>
-              <a:t>2019/01/03</a:t>
-            </a:r>
-            <a:endParaRPr lang="en-US" dirty="0"/>
+              <a:rPr lang="en-US" dirty="0"/>
+              <a:t>2019/01/04</a:t>
+            </a:r>
           </a:p>
         </p:txBody>
       </p:sp>
@@ -31436,10 +31431,9 @@
           <a:lstStyle/>
           <a:p>
             <a:r>
-              <a:rPr lang="en-US"/>
-              <a:t>2019/01/03</a:t>
-            </a:r>
-            <a:endParaRPr lang="en-US" dirty="0"/>
+              <a:rPr lang="en-US" dirty="0"/>
+              <a:t>2019/01/04</a:t>
+            </a:r>
           </a:p>
         </p:txBody>
       </p:sp>
@@ -32891,10 +32885,9 @@
           <a:lstStyle/>
           <a:p>
             <a:r>
-              <a:rPr lang="en-US"/>
-              <a:t>2019/01/03</a:t>
-            </a:r>
-            <a:endParaRPr lang="en-US" dirty="0"/>
+              <a:rPr lang="en-US" dirty="0"/>
+              <a:t>2019/01/04</a:t>
+            </a:r>
           </a:p>
         </p:txBody>
       </p:sp>
@@ -33183,10 +33176,9 @@
           <a:lstStyle/>
           <a:p>
             <a:r>
-              <a:rPr lang="en-US"/>
-              <a:t>2019/01/03</a:t>
-            </a:r>
-            <a:endParaRPr lang="en-US" dirty="0"/>
+              <a:rPr lang="en-US" dirty="0"/>
+              <a:t>2019/01/04</a:t>
+            </a:r>
           </a:p>
         </p:txBody>
       </p:sp>
@@ -33440,10 +33432,9 @@
           <a:lstStyle/>
           <a:p>
             <a:r>
-              <a:rPr lang="en-US"/>
-              <a:t>2019/01/03</a:t>
-            </a:r>
-            <a:endParaRPr lang="en-US" dirty="0"/>
+              <a:rPr lang="en-US" dirty="0"/>
+              <a:t>2019/01/04</a:t>
+            </a:r>
           </a:p>
         </p:txBody>
       </p:sp>
@@ -33776,7 +33767,7 @@
           <a:p>
             <a:r>
               <a:rPr lang="en-US" dirty="0"/>
-              <a:t>2019/01/03</a:t>
+              <a:t>2019/01/04</a:t>
             </a:r>
           </a:p>
         </p:txBody>
@@ -34004,7 +33995,7 @@
           <a:p>
             <a:r>
               <a:rPr lang="en-US" dirty="0"/>
-              <a:t>2019/01/03</a:t>
+              <a:t>2019/01/04</a:t>
             </a:r>
           </a:p>
         </p:txBody>
@@ -34260,7 +34251,7 @@
           <a:p>
             <a:r>
               <a:rPr lang="en-US" dirty="0"/>
-              <a:t>2019/01/03</a:t>
+              <a:t>2019/01/04</a:t>
             </a:r>
           </a:p>
         </p:txBody>
@@ -34523,7 +34514,7 @@
           <a:p>
             <a:r>
               <a:rPr lang="en-US" dirty="0"/>
-              <a:t>2019/01/03</a:t>
+              <a:t>2019/01/04</a:t>
             </a:r>
           </a:p>
         </p:txBody>
@@ -34834,7 +34825,7 @@
           <a:p>
             <a:r>
               <a:rPr lang="en-US" dirty="0"/>
-              <a:t>2019/01/03</a:t>
+              <a:t>2019/01/04</a:t>
             </a:r>
           </a:p>
         </p:txBody>
@@ -35080,7 +35071,7 @@
           <a:p>
             <a:r>
               <a:rPr lang="en-US" dirty="0"/>
-              <a:t>2019/01/03</a:t>
+              <a:t>2019/01/04</a:t>
             </a:r>
           </a:p>
         </p:txBody>

</xml_diff>